<commit_message>
corrected Eoin's email address
</commit_message>
<xml_diff>
--- a/session-materials/Oauth-Session.pptx
+++ b/session-materials/Oauth-Session.pptx
@@ -251,7 +251,7 @@
             <a:fld id="{761FAC92-251B-B34F-B048-8699966A6B34}" type="datetimeFigureOut">
               <a:rPr lang="en-US" smtClean="0"/>
               <a:pPr/>
-              <a:t>21/06/2014</a:t>
+              <a:t>30/06/2014</a:t>
             </a:fld>
             <a:endParaRPr lang="en-GB"/>
           </a:p>
@@ -428,7 +428,7 @@
             <a:fld id="{34B7DD38-5B8A-884F-A4F1-888BCE980ABD}" type="datetimeFigureOut">
               <a:rPr lang="en-GB"/>
               <a:pPr/>
-              <a:t>21/06/2014</a:t>
+              <a:t>30/06/2014</a:t>
             </a:fld>
             <a:endParaRPr lang="en-GB"/>
           </a:p>
@@ -1402,7 +1402,7 @@
             <a:fld id="{B37F9263-0D28-A947-82B3-E306807255D6}" type="datetime1">
               <a:rPr lang="en-GB"/>
               <a:pPr/>
-              <a:t>21/06/2014</a:t>
+              <a:t>30/06/2014</a:t>
             </a:fld>
             <a:endParaRPr lang="en-GB"/>
           </a:p>
@@ -1589,7 +1589,7 @@
             <a:fld id="{F5483EDC-A27D-D447-94F8-607CCF07BA43}" type="datetime1">
               <a:rPr lang="en-GB"/>
               <a:pPr/>
-              <a:t>21/06/2014</a:t>
+              <a:t>30/06/2014</a:t>
             </a:fld>
             <a:endParaRPr lang="en-GB"/>
           </a:p>
@@ -1786,7 +1786,7 @@
             <a:fld id="{D13606D2-9B84-F843-9C89-B9416B784FCA}" type="datetime1">
               <a:rPr lang="en-GB"/>
               <a:pPr/>
-              <a:t>21/06/2014</a:t>
+              <a:t>30/06/2014</a:t>
             </a:fld>
             <a:endParaRPr lang="en-GB"/>
           </a:p>
@@ -1973,7 +1973,7 @@
             <a:fld id="{69BF0744-F7CD-7E4F-9882-55853F706263}" type="datetime1">
               <a:rPr lang="en-GB"/>
               <a:pPr/>
-              <a:t>21/06/2014</a:t>
+              <a:t>30/06/2014</a:t>
             </a:fld>
             <a:endParaRPr lang="en-GB"/>
           </a:p>
@@ -2182,7 +2182,7 @@
             <a:fld id="{6D0236A6-409E-674F-89AC-E896F189E47F}" type="datetime1">
               <a:rPr lang="en-GB"/>
               <a:pPr/>
-              <a:t>21/06/2014</a:t>
+              <a:t>30/06/2014</a:t>
             </a:fld>
             <a:endParaRPr lang="en-GB"/>
           </a:p>
@@ -2487,7 +2487,7 @@
             <a:fld id="{4F6A9725-7D81-084B-9E97-48A18A77D304}" type="datetime1">
               <a:rPr lang="en-GB"/>
               <a:pPr/>
-              <a:t>21/06/2014</a:t>
+              <a:t>30/06/2014</a:t>
             </a:fld>
             <a:endParaRPr lang="en-GB"/>
           </a:p>
@@ -2931,7 +2931,7 @@
             <a:fld id="{36892021-AFE2-7646-9A69-7AF9AF8A9C0C}" type="datetime1">
               <a:rPr lang="en-GB"/>
               <a:pPr/>
-              <a:t>21/06/2014</a:t>
+              <a:t>30/06/2014</a:t>
             </a:fld>
             <a:endParaRPr lang="en-GB"/>
           </a:p>
@@ -3066,7 +3066,7 @@
             <a:fld id="{FCA7C272-6524-5F4A-8F45-7EB0153F335F}" type="datetime1">
               <a:rPr lang="en-GB"/>
               <a:pPr/>
-              <a:t>21/06/2014</a:t>
+              <a:t>30/06/2014</a:t>
             </a:fld>
             <a:endParaRPr lang="en-GB"/>
           </a:p>
@@ -3178,7 +3178,7 @@
             <a:fld id="{231A887B-6191-C147-8923-F80BD8C33FCD}" type="datetime1">
               <a:rPr lang="en-GB"/>
               <a:pPr/>
-              <a:t>21/06/2014</a:t>
+              <a:t>30/06/2014</a:t>
             </a:fld>
             <a:endParaRPr lang="en-GB"/>
           </a:p>
@@ -3472,7 +3472,7 @@
             <a:fld id="{9294713F-FC05-3A40-96CF-B6994D056B93}" type="datetime1">
               <a:rPr lang="en-GB"/>
               <a:pPr/>
-              <a:t>21/06/2014</a:t>
+              <a:t>30/06/2014</a:t>
             </a:fld>
             <a:endParaRPr lang="en-GB"/>
           </a:p>
@@ -3743,7 +3743,7 @@
             <a:fld id="{7CBA5132-EE38-7F4A-835F-B1102FDE0768}" type="datetime1">
               <a:rPr lang="en-GB"/>
               <a:pPr/>
-              <a:t>21/06/2014</a:t>
+              <a:t>30/06/2014</a:t>
             </a:fld>
             <a:endParaRPr lang="en-GB"/>
           </a:p>
@@ -4286,7 +4286,7 @@
             <a:fld id="{97C548F9-45AE-614C-B4B1-E298E2074A53}" type="datetime1">
               <a:rPr lang="en-GB"/>
               <a:pPr/>
-              <a:t>21/06/2014</a:t>
+              <a:t>30/06/2014</a:t>
             </a:fld>
             <a:endParaRPr lang="en-GB"/>
           </a:p>
@@ -5412,25 +5412,24 @@
                 </a:solidFill>
                 <a:hlinkClick r:id="rId4"/>
               </a:rPr>
-              <a:t>eoin</a:t>
-            </a:r>
-            <a:r>
-              <a:rPr lang="en-GB" dirty="0">
+              <a:t>eoin.woods@artechra</a:t>
+            </a:r>
+            <a:r>
+              <a:rPr lang="en-GB" dirty="0" smtClean="0">
                 <a:solidFill>
                   <a:schemeClr val="tx2"/>
                 </a:solidFill>
                 <a:hlinkClick r:id="rId4"/>
               </a:rPr>
-              <a:t>@</a:t>
+              <a:t>.com</a:t>
             </a:r>
             <a:r>
               <a:rPr lang="en-GB" dirty="0" smtClean="0">
                 <a:solidFill>
                   <a:schemeClr val="tx2"/>
                 </a:solidFill>
-                <a:hlinkClick r:id="rId4"/>
-              </a:rPr>
-              <a:t>copse.org.uk</a:t>
+              </a:rPr>
+              <a:t> </a:t>
             </a:r>
             <a:r>
               <a:rPr lang="en-GB" dirty="0" smtClean="0">
@@ -5440,6 +5439,11 @@
               </a:rPr>
               <a:t> </a:t>
             </a:r>
+            <a:endParaRPr lang="en-GB" dirty="0" smtClean="0">
+              <a:solidFill>
+                <a:schemeClr val="tx2"/>
+              </a:solidFill>
+            </a:endParaRPr>
           </a:p>
           <a:p>
             <a:pPr lvl="1"/>
@@ -6887,23 +6891,7 @@
                 <a:ea typeface="ＭＳ Ｐゴシック" charset="0"/>
                 <a:cs typeface="ＭＳ Ｐゴシック" charset="0"/>
               </a:rPr>
-              <a:t>Authorization Code Workflow (</a:t>
-            </a:r>
-            <a:r>
-              <a:rPr lang="en-GB" dirty="0" smtClean="0">
-                <a:latin typeface="Calibri" charset="0"/>
-                <a:ea typeface="ＭＳ Ｐゴシック" charset="0"/>
-                <a:cs typeface="ＭＳ Ｐゴシック" charset="0"/>
-              </a:rPr>
-              <a:t>No-Redirect</a:t>
-            </a:r>
-            <a:r>
-              <a:rPr lang="en-GB" dirty="0" smtClean="0">
-                <a:latin typeface="Calibri" charset="0"/>
-                <a:ea typeface="ＭＳ Ｐゴシック" charset="0"/>
-                <a:cs typeface="ＭＳ Ｐゴシック" charset="0"/>
-              </a:rPr>
-              <a:t>)</a:t>
+              <a:t>Authorization Code Workflow (No-Redirect)</a:t>
             </a:r>
             <a:endParaRPr lang="en-GB" dirty="0">
               <a:latin typeface="Calibri" charset="0"/>
@@ -13562,15 +13550,7 @@
                 <a:ea typeface="ＭＳ Ｐゴシック" charset="0"/>
                 <a:cs typeface="ＭＳ Ｐゴシック" charset="0"/>
               </a:rPr>
-              <a:t>What’s in the </a:t>
-            </a:r>
-            <a:r>
-              <a:rPr lang="en-GB" dirty="0" smtClean="0">
-                <a:latin typeface="Calibri" charset="0"/>
-                <a:ea typeface="ＭＳ Ｐゴシック" charset="0"/>
-                <a:cs typeface="ＭＳ Ｐゴシック" charset="0"/>
-              </a:rPr>
-              <a:t>Repository (</a:t>
+              <a:t>What’s in the Repository (</a:t>
             </a:r>
             <a:r>
               <a:rPr lang="en-GB" i="1" dirty="0" smtClean="0">
@@ -21868,11 +21848,6 @@
               </a:rPr>
               <a:t>”</a:t>
             </a:r>
-            <a:endParaRPr lang="en-GB" sz="11000" baseline="-25000" dirty="0" smtClean="0">
-              <a:latin typeface="Garamond"/>
-              <a:ea typeface="ＭＳ Ｐゴシック" charset="0"/>
-              <a:cs typeface="Garamond"/>
-            </a:endParaRPr>
           </a:p>
         </p:txBody>
       </p:sp>

</xml_diff>